<commit_message>
adding of the prototype lesson
</commit_message>
<xml_diff>
--- a/expose-JS-POO-prototype/Prototyope Objet en Javascript.pptx
+++ b/expose-JS-POO-prototype/Prototyope Objet en Javascript.pptx
@@ -268,7 +268,7 @@
           <a:p>
             <a:fld id="{DAED8C52-DC4E-4809-99A2-825E1040CFFB}" type="datetimeFigureOut">
               <a:rPr lang="fr-FR" smtClean="0"/>
-              <a:t>27/04/2021</a:t>
+              <a:t>28/04/2021</a:t>
             </a:fld>
             <a:endParaRPr lang="fr-FR"/>
           </a:p>
@@ -466,7 +466,7 @@
           <a:p>
             <a:fld id="{DAED8C52-DC4E-4809-99A2-825E1040CFFB}" type="datetimeFigureOut">
               <a:rPr lang="fr-FR" smtClean="0"/>
-              <a:t>27/04/2021</a:t>
+              <a:t>28/04/2021</a:t>
             </a:fld>
             <a:endParaRPr lang="fr-FR"/>
           </a:p>
@@ -674,7 +674,7 @@
           <a:p>
             <a:fld id="{DAED8C52-DC4E-4809-99A2-825E1040CFFB}" type="datetimeFigureOut">
               <a:rPr lang="fr-FR" smtClean="0"/>
-              <a:t>27/04/2021</a:t>
+              <a:t>28/04/2021</a:t>
             </a:fld>
             <a:endParaRPr lang="fr-FR"/>
           </a:p>
@@ -872,7 +872,7 @@
           <a:p>
             <a:fld id="{DAED8C52-DC4E-4809-99A2-825E1040CFFB}" type="datetimeFigureOut">
               <a:rPr lang="fr-FR" smtClean="0"/>
-              <a:t>27/04/2021</a:t>
+              <a:t>28/04/2021</a:t>
             </a:fld>
             <a:endParaRPr lang="fr-FR"/>
           </a:p>
@@ -1147,7 +1147,7 @@
           <a:p>
             <a:fld id="{DAED8C52-DC4E-4809-99A2-825E1040CFFB}" type="datetimeFigureOut">
               <a:rPr lang="fr-FR" smtClean="0"/>
-              <a:t>27/04/2021</a:t>
+              <a:t>28/04/2021</a:t>
             </a:fld>
             <a:endParaRPr lang="fr-FR"/>
           </a:p>
@@ -1412,7 +1412,7 @@
           <a:p>
             <a:fld id="{DAED8C52-DC4E-4809-99A2-825E1040CFFB}" type="datetimeFigureOut">
               <a:rPr lang="fr-FR" smtClean="0"/>
-              <a:t>27/04/2021</a:t>
+              <a:t>28/04/2021</a:t>
             </a:fld>
             <a:endParaRPr lang="fr-FR"/>
           </a:p>
@@ -1824,7 +1824,7 @@
           <a:p>
             <a:fld id="{DAED8C52-DC4E-4809-99A2-825E1040CFFB}" type="datetimeFigureOut">
               <a:rPr lang="fr-FR" smtClean="0"/>
-              <a:t>27/04/2021</a:t>
+              <a:t>28/04/2021</a:t>
             </a:fld>
             <a:endParaRPr lang="fr-FR"/>
           </a:p>
@@ -1965,7 +1965,7 @@
           <a:p>
             <a:fld id="{DAED8C52-DC4E-4809-99A2-825E1040CFFB}" type="datetimeFigureOut">
               <a:rPr lang="fr-FR" smtClean="0"/>
-              <a:t>27/04/2021</a:t>
+              <a:t>28/04/2021</a:t>
             </a:fld>
             <a:endParaRPr lang="fr-FR"/>
           </a:p>
@@ -2078,7 +2078,7 @@
           <a:p>
             <a:fld id="{DAED8C52-DC4E-4809-99A2-825E1040CFFB}" type="datetimeFigureOut">
               <a:rPr lang="fr-FR" smtClean="0"/>
-              <a:t>27/04/2021</a:t>
+              <a:t>28/04/2021</a:t>
             </a:fld>
             <a:endParaRPr lang="fr-FR"/>
           </a:p>
@@ -2389,7 +2389,7 @@
           <a:p>
             <a:fld id="{DAED8C52-DC4E-4809-99A2-825E1040CFFB}" type="datetimeFigureOut">
               <a:rPr lang="fr-FR" smtClean="0"/>
-              <a:t>27/04/2021</a:t>
+              <a:t>28/04/2021</a:t>
             </a:fld>
             <a:endParaRPr lang="fr-FR"/>
           </a:p>
@@ -2677,7 +2677,7 @@
           <a:p>
             <a:fld id="{DAED8C52-DC4E-4809-99A2-825E1040CFFB}" type="datetimeFigureOut">
               <a:rPr lang="fr-FR" smtClean="0"/>
-              <a:t>27/04/2021</a:t>
+              <a:t>28/04/2021</a:t>
             </a:fld>
             <a:endParaRPr lang="fr-FR"/>
           </a:p>
@@ -2918,7 +2918,7 @@
           <a:p>
             <a:fld id="{DAED8C52-DC4E-4809-99A2-825E1040CFFB}" type="datetimeFigureOut">
               <a:rPr lang="fr-FR" smtClean="0"/>
-              <a:t>27/04/2021</a:t>
+              <a:t>28/04/2021</a:t>
             </a:fld>
             <a:endParaRPr lang="fr-FR"/>
           </a:p>
@@ -5550,7 +5550,52 @@
                 <a:effectLst/>
                 <a:latin typeface="-apple-system"/>
               </a:rPr>
-              <a:t> d’un constructeur va être partagé par tous les objets créés à partir de ce constructeur. Comme cette propriété est un objet, on va pouvoir lui ajouter des propriétés et des méthodes que tous les objets créés à partir du constructeur vont partager</a:t>
+              <a:t> d’un constructeur va être partagé par tous les objets créés à partir de ce constructeur. Comme cette propriété est un objet, on va pouvoir lui ajouter des propriétés et des méthodes que tous les objets créés à partir du constructeur vont partager.</a:t>
+            </a:r>
+          </a:p>
+          <a:p>
+            <a:pPr marL="0" marR="0" lvl="0" indent="0" algn="just" defTabSz="914400" rtl="0" eaLnBrk="0" fontAlgn="base" latinLnBrk="0" hangingPunct="0">
+              <a:lnSpc>
+                <a:spcPct val="100000"/>
+              </a:lnSpc>
+              <a:spcBef>
+                <a:spcPct val="0"/>
+              </a:spcBef>
+              <a:spcAft>
+                <a:spcPct val="0"/>
+              </a:spcAft>
+              <a:buClrTx/>
+              <a:buSzTx/>
+              <a:buFontTx/>
+              <a:buNone/>
+              <a:tabLst/>
+            </a:pPr>
+            <a:r>
+              <a:rPr lang="fr-FR" altLang="fr-FR" sz="2800" dirty="0">
+                <a:solidFill>
+                  <a:schemeClr val="bg1"/>
+                </a:solidFill>
+                <a:latin typeface="-apple-system"/>
+              </a:rPr>
+              <a:t>C’est une bonne alternative à </a:t>
+            </a:r>
+            <a:r>
+              <a:rPr lang="fr-FR" altLang="fr-FR" sz="2800" dirty="0" err="1">
+                <a:solidFill>
+                  <a:schemeClr val="bg1"/>
+                </a:solidFill>
+                <a:latin typeface="-apple-system"/>
+              </a:rPr>
+              <a:t>Object.create</a:t>
+            </a:r>
+            <a:r>
+              <a:rPr lang="fr-FR" altLang="fr-FR" sz="2800" dirty="0">
+                <a:solidFill>
+                  <a:schemeClr val="bg1"/>
+                </a:solidFill>
+                <a:latin typeface="-apple-system"/>
+              </a:rPr>
+              <a:t>().</a:t>
             </a:r>
             <a:endParaRPr kumimoji="0" lang="fr-FR" altLang="fr-FR" sz="4000" b="0" i="0" u="none" strike="noStrike" cap="none" normalizeH="0" baseline="0" dirty="0">
               <a:ln>

</xml_diff>